<commit_message>
Add plots for supplement
</commit_message>
<xml_diff>
--- a/plots/slice/figures.pptx
+++ b/plots/slice/figures.pptx
@@ -6,13 +6,16 @@
   </p:sldMasterIdLst>
   <p:sldIdLst>
     <p:sldId id="256" r:id="rId2"/>
-    <p:sldId id="257" r:id="rId3"/>
-    <p:sldId id="258" r:id="rId4"/>
-    <p:sldId id="263" r:id="rId5"/>
-    <p:sldId id="261" r:id="rId6"/>
-    <p:sldId id="262" r:id="rId7"/>
-    <p:sldId id="264" r:id="rId8"/>
-    <p:sldId id="265" r:id="rId9"/>
+    <p:sldId id="267" r:id="rId3"/>
+    <p:sldId id="266" r:id="rId4"/>
+    <p:sldId id="268" r:id="rId5"/>
+    <p:sldId id="257" r:id="rId6"/>
+    <p:sldId id="258" r:id="rId7"/>
+    <p:sldId id="263" r:id="rId8"/>
+    <p:sldId id="261" r:id="rId9"/>
+    <p:sldId id="262" r:id="rId10"/>
+    <p:sldId id="264" r:id="rId11"/>
+    <p:sldId id="265" r:id="rId12"/>
   </p:sldIdLst>
   <p:sldSz cx="12192000" cy="6858000"/>
   <p:notesSz cx="6858000" cy="9144000"/>
@@ -580,6 +583,224 @@
     </pc:docChg>
   </pc:docChgLst>
   <pc:docChgLst>
+    <pc:chgData name="Alex de Beer" userId="62bc9c83-618c-4918-a69a-d4af0e70eebf" providerId="ADAL" clId="{674907BB-71C4-0C4A-82EB-9C5F70FC5B9B}"/>
+    <pc:docChg chg="undo custSel modSld">
+      <pc:chgData name="Alex de Beer" userId="62bc9c83-618c-4918-a69a-d4af0e70eebf" providerId="ADAL" clId="{674907BB-71C4-0C4A-82EB-9C5F70FC5B9B}" dt="2024-01-20T20:36:13.603" v="55" actId="478"/>
+      <pc:docMkLst>
+        <pc:docMk/>
+      </pc:docMkLst>
+      <pc:sldChg chg="addSp delSp modSp mod">
+        <pc:chgData name="Alex de Beer" userId="62bc9c83-618c-4918-a69a-d4af0e70eebf" providerId="ADAL" clId="{674907BB-71C4-0C4A-82EB-9C5F70FC5B9B}" dt="2024-01-20T20:32:00.399" v="3" actId="478"/>
+        <pc:sldMkLst>
+          <pc:docMk/>
+          <pc:sldMk cId="2484631522" sldId="256"/>
+        </pc:sldMkLst>
+        <pc:picChg chg="add mod">
+          <ac:chgData name="Alex de Beer" userId="62bc9c83-618c-4918-a69a-d4af0e70eebf" providerId="ADAL" clId="{674907BB-71C4-0C4A-82EB-9C5F70FC5B9B}" dt="2024-01-20T20:31:57.184" v="2" actId="167"/>
+          <ac:picMkLst>
+            <pc:docMk/>
+            <pc:sldMk cId="2484631522" sldId="256"/>
+            <ac:picMk id="3" creationId="{489BA681-BF4C-5791-2FC1-36D25DD6A810}"/>
+          </ac:picMkLst>
+        </pc:picChg>
+        <pc:picChg chg="del">
+          <ac:chgData name="Alex de Beer" userId="62bc9c83-618c-4918-a69a-d4af0e70eebf" providerId="ADAL" clId="{674907BB-71C4-0C4A-82EB-9C5F70FC5B9B}" dt="2024-01-20T20:32:00.399" v="3" actId="478"/>
+          <ac:picMkLst>
+            <pc:docMk/>
+            <pc:sldMk cId="2484631522" sldId="256"/>
+            <ac:picMk id="4" creationId="{E3B22B7F-026A-911B-A3F7-8939DDCA8221}"/>
+          </ac:picMkLst>
+        </pc:picChg>
+      </pc:sldChg>
+      <pc:sldChg chg="addSp delSp modSp mod">
+        <pc:chgData name="Alex de Beer" userId="62bc9c83-618c-4918-a69a-d4af0e70eebf" providerId="ADAL" clId="{674907BB-71C4-0C4A-82EB-9C5F70FC5B9B}" dt="2024-01-20T20:32:19.543" v="10"/>
+        <pc:sldMkLst>
+          <pc:docMk/>
+          <pc:sldMk cId="1325021698" sldId="257"/>
+        </pc:sldMkLst>
+        <pc:spChg chg="add del mod">
+          <ac:chgData name="Alex de Beer" userId="62bc9c83-618c-4918-a69a-d4af0e70eebf" providerId="ADAL" clId="{674907BB-71C4-0C4A-82EB-9C5F70FC5B9B}" dt="2024-01-20T20:32:19.543" v="10"/>
+          <ac:spMkLst>
+            <pc:docMk/>
+            <pc:sldMk cId="1325021698" sldId="257"/>
+            <ac:spMk id="4" creationId="{31B010E8-00F6-1708-B04A-F2BEDB321EEB}"/>
+          </ac:spMkLst>
+        </pc:spChg>
+        <pc:picChg chg="add mod">
+          <ac:chgData name="Alex de Beer" userId="62bc9c83-618c-4918-a69a-d4af0e70eebf" providerId="ADAL" clId="{674907BB-71C4-0C4A-82EB-9C5F70FC5B9B}" dt="2024-01-20T20:32:11.147" v="6" actId="167"/>
+          <ac:picMkLst>
+            <pc:docMk/>
+            <pc:sldMk cId="1325021698" sldId="257"/>
+            <ac:picMk id="3" creationId="{4F1B211F-9945-6892-3F33-9B2D817AD9AB}"/>
+          </ac:picMkLst>
+        </pc:picChg>
+        <pc:picChg chg="del">
+          <ac:chgData name="Alex de Beer" userId="62bc9c83-618c-4918-a69a-d4af0e70eebf" providerId="ADAL" clId="{674907BB-71C4-0C4A-82EB-9C5F70FC5B9B}" dt="2024-01-20T20:32:12.124" v="7" actId="478"/>
+          <ac:picMkLst>
+            <pc:docMk/>
+            <pc:sldMk cId="1325021698" sldId="257"/>
+            <ac:picMk id="5" creationId="{82D9B692-A99D-FA48-E8F6-DB96FA2A7FCC}"/>
+          </ac:picMkLst>
+        </pc:picChg>
+      </pc:sldChg>
+      <pc:sldChg chg="addSp delSp modSp mod">
+        <pc:chgData name="Alex de Beer" userId="62bc9c83-618c-4918-a69a-d4af0e70eebf" providerId="ADAL" clId="{674907BB-71C4-0C4A-82EB-9C5F70FC5B9B}" dt="2024-01-20T20:33:13.701" v="37" actId="1036"/>
+        <pc:sldMkLst>
+          <pc:docMk/>
+          <pc:sldMk cId="646731269" sldId="258"/>
+        </pc:sldMkLst>
+        <pc:grpChg chg="add del">
+          <ac:chgData name="Alex de Beer" userId="62bc9c83-618c-4918-a69a-d4af0e70eebf" providerId="ADAL" clId="{674907BB-71C4-0C4A-82EB-9C5F70FC5B9B}" dt="2024-01-20T20:32:57.021" v="18" actId="478"/>
+          <ac:grpSpMkLst>
+            <pc:docMk/>
+            <pc:sldMk cId="646731269" sldId="258"/>
+            <ac:grpSpMk id="7" creationId="{6024ECFE-DAF2-54BD-B540-EFD86D6606D7}"/>
+          </ac:grpSpMkLst>
+        </pc:grpChg>
+        <pc:grpChg chg="del">
+          <ac:chgData name="Alex de Beer" userId="62bc9c83-618c-4918-a69a-d4af0e70eebf" providerId="ADAL" clId="{674907BB-71C4-0C4A-82EB-9C5F70FC5B9B}" dt="2024-01-20T20:32:58.806" v="19" actId="478"/>
+          <ac:grpSpMkLst>
+            <pc:docMk/>
+            <pc:sldMk cId="646731269" sldId="258"/>
+            <ac:grpSpMk id="11" creationId="{D891492E-F567-DB86-6201-1931F6065189}"/>
+          </ac:grpSpMkLst>
+        </pc:grpChg>
+        <pc:picChg chg="add del mod topLvl">
+          <ac:chgData name="Alex de Beer" userId="62bc9c83-618c-4918-a69a-d4af0e70eebf" providerId="ADAL" clId="{674907BB-71C4-0C4A-82EB-9C5F70FC5B9B}" dt="2024-01-20T20:32:57.021" v="18" actId="478"/>
+          <ac:picMkLst>
+            <pc:docMk/>
+            <pc:sldMk cId="646731269" sldId="258"/>
+            <ac:picMk id="3" creationId="{F0349386-5515-0EA7-2D34-724223D976FC}"/>
+          </ac:picMkLst>
+        </pc:picChg>
+        <pc:picChg chg="add mod">
+          <ac:chgData name="Alex de Beer" userId="62bc9c83-618c-4918-a69a-d4af0e70eebf" providerId="ADAL" clId="{674907BB-71C4-0C4A-82EB-9C5F70FC5B9B}" dt="2024-01-20T20:32:47.913" v="15" actId="167"/>
+          <ac:picMkLst>
+            <pc:docMk/>
+            <pc:sldMk cId="646731269" sldId="258"/>
+            <ac:picMk id="4" creationId="{934B3605-9732-F050-1969-A48DC09C941F}"/>
+          </ac:picMkLst>
+        </pc:picChg>
+        <pc:picChg chg="del mod topLvl">
+          <ac:chgData name="Alex de Beer" userId="62bc9c83-618c-4918-a69a-d4af0e70eebf" providerId="ADAL" clId="{674907BB-71C4-0C4A-82EB-9C5F70FC5B9B}" dt="2024-01-20T20:33:06.997" v="22" actId="478"/>
+          <ac:picMkLst>
+            <pc:docMk/>
+            <pc:sldMk cId="646731269" sldId="258"/>
+            <ac:picMk id="5" creationId="{7D4AAE82-F9AF-8C9F-D90D-C558C28880CF}"/>
+          </ac:picMkLst>
+        </pc:picChg>
+        <pc:picChg chg="del topLvl">
+          <ac:chgData name="Alex de Beer" userId="62bc9c83-618c-4918-a69a-d4af0e70eebf" providerId="ADAL" clId="{674907BB-71C4-0C4A-82EB-9C5F70FC5B9B}" dt="2024-01-20T20:32:58.806" v="19" actId="478"/>
+          <ac:picMkLst>
+            <pc:docMk/>
+            <pc:sldMk cId="646731269" sldId="258"/>
+            <ac:picMk id="6" creationId="{70F5511D-90CD-AA93-3A84-D3DF458E3948}"/>
+          </ac:picMkLst>
+        </pc:picChg>
+        <pc:picChg chg="del topLvl">
+          <ac:chgData name="Alex de Beer" userId="62bc9c83-618c-4918-a69a-d4af0e70eebf" providerId="ADAL" clId="{674907BB-71C4-0C4A-82EB-9C5F70FC5B9B}" dt="2024-01-20T20:33:02.046" v="20" actId="478"/>
+          <ac:picMkLst>
+            <pc:docMk/>
+            <pc:sldMk cId="646731269" sldId="258"/>
+            <ac:picMk id="9" creationId="{1335B327-8453-8E5F-C707-737534D54C98}"/>
+          </ac:picMkLst>
+        </pc:picChg>
+        <pc:picChg chg="add mod">
+          <ac:chgData name="Alex de Beer" userId="62bc9c83-618c-4918-a69a-d4af0e70eebf" providerId="ADAL" clId="{674907BB-71C4-0C4A-82EB-9C5F70FC5B9B}" dt="2024-01-20T20:33:13.701" v="37" actId="1036"/>
+          <ac:picMkLst>
+            <pc:docMk/>
+            <pc:sldMk cId="646731269" sldId="258"/>
+            <ac:picMk id="10" creationId="{A9617D01-91F2-3645-AECE-63DEF7E6148C}"/>
+          </ac:picMkLst>
+        </pc:picChg>
+      </pc:sldChg>
+      <pc:sldChg chg="addSp delSp modSp mod">
+        <pc:chgData name="Alex de Beer" userId="62bc9c83-618c-4918-a69a-d4af0e70eebf" providerId="ADAL" clId="{674907BB-71C4-0C4A-82EB-9C5F70FC5B9B}" dt="2024-01-20T20:35:21.671" v="50" actId="478"/>
+        <pc:sldMkLst>
+          <pc:docMk/>
+          <pc:sldMk cId="3066156474" sldId="261"/>
+        </pc:sldMkLst>
+        <pc:picChg chg="add mod">
+          <ac:chgData name="Alex de Beer" userId="62bc9c83-618c-4918-a69a-d4af0e70eebf" providerId="ADAL" clId="{674907BB-71C4-0C4A-82EB-9C5F70FC5B9B}" dt="2024-01-20T20:35:19.755" v="49" actId="167"/>
+          <ac:picMkLst>
+            <pc:docMk/>
+            <pc:sldMk cId="3066156474" sldId="261"/>
+            <ac:picMk id="3" creationId="{C3524015-6F62-E937-4CB0-7BFE95DEA5DA}"/>
+          </ac:picMkLst>
+        </pc:picChg>
+        <pc:picChg chg="del">
+          <ac:chgData name="Alex de Beer" userId="62bc9c83-618c-4918-a69a-d4af0e70eebf" providerId="ADAL" clId="{674907BB-71C4-0C4A-82EB-9C5F70FC5B9B}" dt="2024-01-20T20:35:21.671" v="50" actId="478"/>
+          <ac:picMkLst>
+            <pc:docMk/>
+            <pc:sldMk cId="3066156474" sldId="261"/>
+            <ac:picMk id="5" creationId="{859B83B8-7F04-45B0-63A4-C1D24CA14A1F}"/>
+          </ac:picMkLst>
+        </pc:picChg>
+      </pc:sldChg>
+      <pc:sldChg chg="addSp modSp mod">
+        <pc:chgData name="Alex de Beer" userId="62bc9c83-618c-4918-a69a-d4af0e70eebf" providerId="ADAL" clId="{674907BB-71C4-0C4A-82EB-9C5F70FC5B9B}" dt="2024-01-20T20:35:47.293" v="52" actId="1076"/>
+        <pc:sldMkLst>
+          <pc:docMk/>
+          <pc:sldMk cId="4029959847" sldId="262"/>
+        </pc:sldMkLst>
+        <pc:picChg chg="add mod">
+          <ac:chgData name="Alex de Beer" userId="62bc9c83-618c-4918-a69a-d4af0e70eebf" providerId="ADAL" clId="{674907BB-71C4-0C4A-82EB-9C5F70FC5B9B}" dt="2024-01-20T20:35:47.293" v="52" actId="1076"/>
+          <ac:picMkLst>
+            <pc:docMk/>
+            <pc:sldMk cId="4029959847" sldId="262"/>
+            <ac:picMk id="4" creationId="{B05FEE1C-2CBD-ABF6-FA34-6B38F3955420}"/>
+          </ac:picMkLst>
+        </pc:picChg>
+      </pc:sldChg>
+      <pc:sldChg chg="addSp delSp modSp mod">
+        <pc:chgData name="Alex de Beer" userId="62bc9c83-618c-4918-a69a-d4af0e70eebf" providerId="ADAL" clId="{674907BB-71C4-0C4A-82EB-9C5F70FC5B9B}" dt="2024-01-20T20:34:47.350" v="45" actId="478"/>
+        <pc:sldMkLst>
+          <pc:docMk/>
+          <pc:sldMk cId="2364536863" sldId="263"/>
+        </pc:sldMkLst>
+        <pc:picChg chg="del mod">
+          <ac:chgData name="Alex de Beer" userId="62bc9c83-618c-4918-a69a-d4af0e70eebf" providerId="ADAL" clId="{674907BB-71C4-0C4A-82EB-9C5F70FC5B9B}" dt="2024-01-20T20:34:47.350" v="45" actId="478"/>
+          <ac:picMkLst>
+            <pc:docMk/>
+            <pc:sldMk cId="2364536863" sldId="263"/>
+            <ac:picMk id="3" creationId="{A3CF06DE-82E9-5514-A8C8-5A40DD97639B}"/>
+          </ac:picMkLst>
+        </pc:picChg>
+        <pc:picChg chg="add mod">
+          <ac:chgData name="Alex de Beer" userId="62bc9c83-618c-4918-a69a-d4af0e70eebf" providerId="ADAL" clId="{674907BB-71C4-0C4A-82EB-9C5F70FC5B9B}" dt="2024-01-20T20:34:34.939" v="43" actId="167"/>
+          <ac:picMkLst>
+            <pc:docMk/>
+            <pc:sldMk cId="2364536863" sldId="263"/>
+            <ac:picMk id="7" creationId="{04B115F9-D514-A42A-083C-434BF98BB87D}"/>
+          </ac:picMkLst>
+        </pc:picChg>
+      </pc:sldChg>
+      <pc:sldChg chg="addSp delSp modSp mod">
+        <pc:chgData name="Alex de Beer" userId="62bc9c83-618c-4918-a69a-d4af0e70eebf" providerId="ADAL" clId="{674907BB-71C4-0C4A-82EB-9C5F70FC5B9B}" dt="2024-01-20T20:36:13.603" v="55" actId="478"/>
+        <pc:sldMkLst>
+          <pc:docMk/>
+          <pc:sldMk cId="1260815481" sldId="264"/>
+        </pc:sldMkLst>
+        <pc:picChg chg="del">
+          <ac:chgData name="Alex de Beer" userId="62bc9c83-618c-4918-a69a-d4af0e70eebf" providerId="ADAL" clId="{674907BB-71C4-0C4A-82EB-9C5F70FC5B9B}" dt="2024-01-20T20:36:13.603" v="55" actId="478"/>
+          <ac:picMkLst>
+            <pc:docMk/>
+            <pc:sldMk cId="1260815481" sldId="264"/>
+            <ac:picMk id="3" creationId="{4C65663D-E618-C845-80A1-49C83CCC5AFD}"/>
+          </ac:picMkLst>
+        </pc:picChg>
+        <pc:picChg chg="add mod">
+          <ac:chgData name="Alex de Beer" userId="62bc9c83-618c-4918-a69a-d4af0e70eebf" providerId="ADAL" clId="{674907BB-71C4-0C4A-82EB-9C5F70FC5B9B}" dt="2024-01-20T20:36:12.035" v="54" actId="167"/>
+          <ac:picMkLst>
+            <pc:docMk/>
+            <pc:sldMk cId="1260815481" sldId="264"/>
+            <ac:picMk id="5" creationId="{C50C0F6A-5699-1711-0CCF-03D24D706DD1}"/>
+          </ac:picMkLst>
+        </pc:picChg>
+      </pc:sldChg>
+    </pc:docChg>
+  </pc:docChgLst>
+  <pc:docChgLst>
     <pc:chgData name="Alex de Beer" userId="62bc9c83-618c-4918-a69a-d4af0e70eebf" providerId="ADAL" clId="{4B0E4E54-4FF5-114A-914A-3D74979B90CA}"/>
     <pc:docChg chg="undo custSel addSld delSld modSld">
       <pc:chgData name="Alex de Beer" userId="62bc9c83-618c-4918-a69a-d4af0e70eebf" providerId="ADAL" clId="{4B0E4E54-4FF5-114A-914A-3D74979B90CA}" dt="2024-02-08T21:14:08.365" v="526" actId="478"/>
@@ -1142,224 +1363,6 @@
             <pc:docMk/>
             <pc:sldMk cId="2644506099" sldId="265"/>
             <ac:picMk id="10" creationId="{970B6A4E-5EE3-7F0E-3B16-DE54E8B0CBFA}"/>
-          </ac:picMkLst>
-        </pc:picChg>
-      </pc:sldChg>
-    </pc:docChg>
-  </pc:docChgLst>
-  <pc:docChgLst>
-    <pc:chgData name="Alex de Beer" userId="62bc9c83-618c-4918-a69a-d4af0e70eebf" providerId="ADAL" clId="{674907BB-71C4-0C4A-82EB-9C5F70FC5B9B}"/>
-    <pc:docChg chg="undo custSel modSld">
-      <pc:chgData name="Alex de Beer" userId="62bc9c83-618c-4918-a69a-d4af0e70eebf" providerId="ADAL" clId="{674907BB-71C4-0C4A-82EB-9C5F70FC5B9B}" dt="2024-01-20T20:36:13.603" v="55" actId="478"/>
-      <pc:docMkLst>
-        <pc:docMk/>
-      </pc:docMkLst>
-      <pc:sldChg chg="addSp delSp modSp mod">
-        <pc:chgData name="Alex de Beer" userId="62bc9c83-618c-4918-a69a-d4af0e70eebf" providerId="ADAL" clId="{674907BB-71C4-0C4A-82EB-9C5F70FC5B9B}" dt="2024-01-20T20:32:00.399" v="3" actId="478"/>
-        <pc:sldMkLst>
-          <pc:docMk/>
-          <pc:sldMk cId="2484631522" sldId="256"/>
-        </pc:sldMkLst>
-        <pc:picChg chg="add mod">
-          <ac:chgData name="Alex de Beer" userId="62bc9c83-618c-4918-a69a-d4af0e70eebf" providerId="ADAL" clId="{674907BB-71C4-0C4A-82EB-9C5F70FC5B9B}" dt="2024-01-20T20:31:57.184" v="2" actId="167"/>
-          <ac:picMkLst>
-            <pc:docMk/>
-            <pc:sldMk cId="2484631522" sldId="256"/>
-            <ac:picMk id="3" creationId="{489BA681-BF4C-5791-2FC1-36D25DD6A810}"/>
-          </ac:picMkLst>
-        </pc:picChg>
-        <pc:picChg chg="del">
-          <ac:chgData name="Alex de Beer" userId="62bc9c83-618c-4918-a69a-d4af0e70eebf" providerId="ADAL" clId="{674907BB-71C4-0C4A-82EB-9C5F70FC5B9B}" dt="2024-01-20T20:32:00.399" v="3" actId="478"/>
-          <ac:picMkLst>
-            <pc:docMk/>
-            <pc:sldMk cId="2484631522" sldId="256"/>
-            <ac:picMk id="4" creationId="{E3B22B7F-026A-911B-A3F7-8939DDCA8221}"/>
-          </ac:picMkLst>
-        </pc:picChg>
-      </pc:sldChg>
-      <pc:sldChg chg="addSp delSp modSp mod">
-        <pc:chgData name="Alex de Beer" userId="62bc9c83-618c-4918-a69a-d4af0e70eebf" providerId="ADAL" clId="{674907BB-71C4-0C4A-82EB-9C5F70FC5B9B}" dt="2024-01-20T20:32:19.543" v="10"/>
-        <pc:sldMkLst>
-          <pc:docMk/>
-          <pc:sldMk cId="1325021698" sldId="257"/>
-        </pc:sldMkLst>
-        <pc:spChg chg="add del mod">
-          <ac:chgData name="Alex de Beer" userId="62bc9c83-618c-4918-a69a-d4af0e70eebf" providerId="ADAL" clId="{674907BB-71C4-0C4A-82EB-9C5F70FC5B9B}" dt="2024-01-20T20:32:19.543" v="10"/>
-          <ac:spMkLst>
-            <pc:docMk/>
-            <pc:sldMk cId="1325021698" sldId="257"/>
-            <ac:spMk id="4" creationId="{31B010E8-00F6-1708-B04A-F2BEDB321EEB}"/>
-          </ac:spMkLst>
-        </pc:spChg>
-        <pc:picChg chg="add mod">
-          <ac:chgData name="Alex de Beer" userId="62bc9c83-618c-4918-a69a-d4af0e70eebf" providerId="ADAL" clId="{674907BB-71C4-0C4A-82EB-9C5F70FC5B9B}" dt="2024-01-20T20:32:11.147" v="6" actId="167"/>
-          <ac:picMkLst>
-            <pc:docMk/>
-            <pc:sldMk cId="1325021698" sldId="257"/>
-            <ac:picMk id="3" creationId="{4F1B211F-9945-6892-3F33-9B2D817AD9AB}"/>
-          </ac:picMkLst>
-        </pc:picChg>
-        <pc:picChg chg="del">
-          <ac:chgData name="Alex de Beer" userId="62bc9c83-618c-4918-a69a-d4af0e70eebf" providerId="ADAL" clId="{674907BB-71C4-0C4A-82EB-9C5F70FC5B9B}" dt="2024-01-20T20:32:12.124" v="7" actId="478"/>
-          <ac:picMkLst>
-            <pc:docMk/>
-            <pc:sldMk cId="1325021698" sldId="257"/>
-            <ac:picMk id="5" creationId="{82D9B692-A99D-FA48-E8F6-DB96FA2A7FCC}"/>
-          </ac:picMkLst>
-        </pc:picChg>
-      </pc:sldChg>
-      <pc:sldChg chg="addSp delSp modSp mod">
-        <pc:chgData name="Alex de Beer" userId="62bc9c83-618c-4918-a69a-d4af0e70eebf" providerId="ADAL" clId="{674907BB-71C4-0C4A-82EB-9C5F70FC5B9B}" dt="2024-01-20T20:33:13.701" v="37" actId="1036"/>
-        <pc:sldMkLst>
-          <pc:docMk/>
-          <pc:sldMk cId="646731269" sldId="258"/>
-        </pc:sldMkLst>
-        <pc:grpChg chg="add del">
-          <ac:chgData name="Alex de Beer" userId="62bc9c83-618c-4918-a69a-d4af0e70eebf" providerId="ADAL" clId="{674907BB-71C4-0C4A-82EB-9C5F70FC5B9B}" dt="2024-01-20T20:32:57.021" v="18" actId="478"/>
-          <ac:grpSpMkLst>
-            <pc:docMk/>
-            <pc:sldMk cId="646731269" sldId="258"/>
-            <ac:grpSpMk id="7" creationId="{6024ECFE-DAF2-54BD-B540-EFD86D6606D7}"/>
-          </ac:grpSpMkLst>
-        </pc:grpChg>
-        <pc:grpChg chg="del">
-          <ac:chgData name="Alex de Beer" userId="62bc9c83-618c-4918-a69a-d4af0e70eebf" providerId="ADAL" clId="{674907BB-71C4-0C4A-82EB-9C5F70FC5B9B}" dt="2024-01-20T20:32:58.806" v="19" actId="478"/>
-          <ac:grpSpMkLst>
-            <pc:docMk/>
-            <pc:sldMk cId="646731269" sldId="258"/>
-            <ac:grpSpMk id="11" creationId="{D891492E-F567-DB86-6201-1931F6065189}"/>
-          </ac:grpSpMkLst>
-        </pc:grpChg>
-        <pc:picChg chg="add del mod topLvl">
-          <ac:chgData name="Alex de Beer" userId="62bc9c83-618c-4918-a69a-d4af0e70eebf" providerId="ADAL" clId="{674907BB-71C4-0C4A-82EB-9C5F70FC5B9B}" dt="2024-01-20T20:32:57.021" v="18" actId="478"/>
-          <ac:picMkLst>
-            <pc:docMk/>
-            <pc:sldMk cId="646731269" sldId="258"/>
-            <ac:picMk id="3" creationId="{F0349386-5515-0EA7-2D34-724223D976FC}"/>
-          </ac:picMkLst>
-        </pc:picChg>
-        <pc:picChg chg="add mod">
-          <ac:chgData name="Alex de Beer" userId="62bc9c83-618c-4918-a69a-d4af0e70eebf" providerId="ADAL" clId="{674907BB-71C4-0C4A-82EB-9C5F70FC5B9B}" dt="2024-01-20T20:32:47.913" v="15" actId="167"/>
-          <ac:picMkLst>
-            <pc:docMk/>
-            <pc:sldMk cId="646731269" sldId="258"/>
-            <ac:picMk id="4" creationId="{934B3605-9732-F050-1969-A48DC09C941F}"/>
-          </ac:picMkLst>
-        </pc:picChg>
-        <pc:picChg chg="del mod topLvl">
-          <ac:chgData name="Alex de Beer" userId="62bc9c83-618c-4918-a69a-d4af0e70eebf" providerId="ADAL" clId="{674907BB-71C4-0C4A-82EB-9C5F70FC5B9B}" dt="2024-01-20T20:33:06.997" v="22" actId="478"/>
-          <ac:picMkLst>
-            <pc:docMk/>
-            <pc:sldMk cId="646731269" sldId="258"/>
-            <ac:picMk id="5" creationId="{7D4AAE82-F9AF-8C9F-D90D-C558C28880CF}"/>
-          </ac:picMkLst>
-        </pc:picChg>
-        <pc:picChg chg="del topLvl">
-          <ac:chgData name="Alex de Beer" userId="62bc9c83-618c-4918-a69a-d4af0e70eebf" providerId="ADAL" clId="{674907BB-71C4-0C4A-82EB-9C5F70FC5B9B}" dt="2024-01-20T20:32:58.806" v="19" actId="478"/>
-          <ac:picMkLst>
-            <pc:docMk/>
-            <pc:sldMk cId="646731269" sldId="258"/>
-            <ac:picMk id="6" creationId="{70F5511D-90CD-AA93-3A84-D3DF458E3948}"/>
-          </ac:picMkLst>
-        </pc:picChg>
-        <pc:picChg chg="del topLvl">
-          <ac:chgData name="Alex de Beer" userId="62bc9c83-618c-4918-a69a-d4af0e70eebf" providerId="ADAL" clId="{674907BB-71C4-0C4A-82EB-9C5F70FC5B9B}" dt="2024-01-20T20:33:02.046" v="20" actId="478"/>
-          <ac:picMkLst>
-            <pc:docMk/>
-            <pc:sldMk cId="646731269" sldId="258"/>
-            <ac:picMk id="9" creationId="{1335B327-8453-8E5F-C707-737534D54C98}"/>
-          </ac:picMkLst>
-        </pc:picChg>
-        <pc:picChg chg="add mod">
-          <ac:chgData name="Alex de Beer" userId="62bc9c83-618c-4918-a69a-d4af0e70eebf" providerId="ADAL" clId="{674907BB-71C4-0C4A-82EB-9C5F70FC5B9B}" dt="2024-01-20T20:33:13.701" v="37" actId="1036"/>
-          <ac:picMkLst>
-            <pc:docMk/>
-            <pc:sldMk cId="646731269" sldId="258"/>
-            <ac:picMk id="10" creationId="{A9617D01-91F2-3645-AECE-63DEF7E6148C}"/>
-          </ac:picMkLst>
-        </pc:picChg>
-      </pc:sldChg>
-      <pc:sldChg chg="addSp delSp modSp mod">
-        <pc:chgData name="Alex de Beer" userId="62bc9c83-618c-4918-a69a-d4af0e70eebf" providerId="ADAL" clId="{674907BB-71C4-0C4A-82EB-9C5F70FC5B9B}" dt="2024-01-20T20:35:21.671" v="50" actId="478"/>
-        <pc:sldMkLst>
-          <pc:docMk/>
-          <pc:sldMk cId="3066156474" sldId="261"/>
-        </pc:sldMkLst>
-        <pc:picChg chg="add mod">
-          <ac:chgData name="Alex de Beer" userId="62bc9c83-618c-4918-a69a-d4af0e70eebf" providerId="ADAL" clId="{674907BB-71C4-0C4A-82EB-9C5F70FC5B9B}" dt="2024-01-20T20:35:19.755" v="49" actId="167"/>
-          <ac:picMkLst>
-            <pc:docMk/>
-            <pc:sldMk cId="3066156474" sldId="261"/>
-            <ac:picMk id="3" creationId="{C3524015-6F62-E937-4CB0-7BFE95DEA5DA}"/>
-          </ac:picMkLst>
-        </pc:picChg>
-        <pc:picChg chg="del">
-          <ac:chgData name="Alex de Beer" userId="62bc9c83-618c-4918-a69a-d4af0e70eebf" providerId="ADAL" clId="{674907BB-71C4-0C4A-82EB-9C5F70FC5B9B}" dt="2024-01-20T20:35:21.671" v="50" actId="478"/>
-          <ac:picMkLst>
-            <pc:docMk/>
-            <pc:sldMk cId="3066156474" sldId="261"/>
-            <ac:picMk id="5" creationId="{859B83B8-7F04-45B0-63A4-C1D24CA14A1F}"/>
-          </ac:picMkLst>
-        </pc:picChg>
-      </pc:sldChg>
-      <pc:sldChg chg="addSp modSp mod">
-        <pc:chgData name="Alex de Beer" userId="62bc9c83-618c-4918-a69a-d4af0e70eebf" providerId="ADAL" clId="{674907BB-71C4-0C4A-82EB-9C5F70FC5B9B}" dt="2024-01-20T20:35:47.293" v="52" actId="1076"/>
-        <pc:sldMkLst>
-          <pc:docMk/>
-          <pc:sldMk cId="4029959847" sldId="262"/>
-        </pc:sldMkLst>
-        <pc:picChg chg="add mod">
-          <ac:chgData name="Alex de Beer" userId="62bc9c83-618c-4918-a69a-d4af0e70eebf" providerId="ADAL" clId="{674907BB-71C4-0C4A-82EB-9C5F70FC5B9B}" dt="2024-01-20T20:35:47.293" v="52" actId="1076"/>
-          <ac:picMkLst>
-            <pc:docMk/>
-            <pc:sldMk cId="4029959847" sldId="262"/>
-            <ac:picMk id="4" creationId="{B05FEE1C-2CBD-ABF6-FA34-6B38F3955420}"/>
-          </ac:picMkLst>
-        </pc:picChg>
-      </pc:sldChg>
-      <pc:sldChg chg="addSp delSp modSp mod">
-        <pc:chgData name="Alex de Beer" userId="62bc9c83-618c-4918-a69a-d4af0e70eebf" providerId="ADAL" clId="{674907BB-71C4-0C4A-82EB-9C5F70FC5B9B}" dt="2024-01-20T20:34:47.350" v="45" actId="478"/>
-        <pc:sldMkLst>
-          <pc:docMk/>
-          <pc:sldMk cId="2364536863" sldId="263"/>
-        </pc:sldMkLst>
-        <pc:picChg chg="del mod">
-          <ac:chgData name="Alex de Beer" userId="62bc9c83-618c-4918-a69a-d4af0e70eebf" providerId="ADAL" clId="{674907BB-71C4-0C4A-82EB-9C5F70FC5B9B}" dt="2024-01-20T20:34:47.350" v="45" actId="478"/>
-          <ac:picMkLst>
-            <pc:docMk/>
-            <pc:sldMk cId="2364536863" sldId="263"/>
-            <ac:picMk id="3" creationId="{A3CF06DE-82E9-5514-A8C8-5A40DD97639B}"/>
-          </ac:picMkLst>
-        </pc:picChg>
-        <pc:picChg chg="add mod">
-          <ac:chgData name="Alex de Beer" userId="62bc9c83-618c-4918-a69a-d4af0e70eebf" providerId="ADAL" clId="{674907BB-71C4-0C4A-82EB-9C5F70FC5B9B}" dt="2024-01-20T20:34:34.939" v="43" actId="167"/>
-          <ac:picMkLst>
-            <pc:docMk/>
-            <pc:sldMk cId="2364536863" sldId="263"/>
-            <ac:picMk id="7" creationId="{04B115F9-D514-A42A-083C-434BF98BB87D}"/>
-          </ac:picMkLst>
-        </pc:picChg>
-      </pc:sldChg>
-      <pc:sldChg chg="addSp delSp modSp mod">
-        <pc:chgData name="Alex de Beer" userId="62bc9c83-618c-4918-a69a-d4af0e70eebf" providerId="ADAL" clId="{674907BB-71C4-0C4A-82EB-9C5F70FC5B9B}" dt="2024-01-20T20:36:13.603" v="55" actId="478"/>
-        <pc:sldMkLst>
-          <pc:docMk/>
-          <pc:sldMk cId="1260815481" sldId="264"/>
-        </pc:sldMkLst>
-        <pc:picChg chg="del">
-          <ac:chgData name="Alex de Beer" userId="62bc9c83-618c-4918-a69a-d4af0e70eebf" providerId="ADAL" clId="{674907BB-71C4-0C4A-82EB-9C5F70FC5B9B}" dt="2024-01-20T20:36:13.603" v="55" actId="478"/>
-          <ac:picMkLst>
-            <pc:docMk/>
-            <pc:sldMk cId="1260815481" sldId="264"/>
-            <ac:picMk id="3" creationId="{4C65663D-E618-C845-80A1-49C83CCC5AFD}"/>
-          </ac:picMkLst>
-        </pc:picChg>
-        <pc:picChg chg="add mod">
-          <ac:chgData name="Alex de Beer" userId="62bc9c83-618c-4918-a69a-d4af0e70eebf" providerId="ADAL" clId="{674907BB-71C4-0C4A-82EB-9C5F70FC5B9B}" dt="2024-01-20T20:36:12.035" v="54" actId="167"/>
-          <ac:picMkLst>
-            <pc:docMk/>
-            <pc:sldMk cId="1260815481" sldId="264"/>
-            <ac:picMk id="5" creationId="{C50C0F6A-5699-1711-0CCF-03D24D706DD1}"/>
           </ac:picMkLst>
         </pc:picChg>
       </pc:sldChg>
@@ -1517,7 +1520,7 @@
           <a:p>
             <a:fld id="{0B1FBA5E-B539-C04F-A446-75F49E57522B}" type="datetimeFigureOut">
               <a:rPr lang="en-US" smtClean="0"/>
-              <a:t>2/9/24</a:t>
+              <a:t>8/4/24</a:t>
             </a:fld>
             <a:endParaRPr lang="en-US"/>
           </a:p>
@@ -1717,7 +1720,7 @@
           <a:p>
             <a:fld id="{0B1FBA5E-B539-C04F-A446-75F49E57522B}" type="datetimeFigureOut">
               <a:rPr lang="en-US" smtClean="0"/>
-              <a:t>2/9/24</a:t>
+              <a:t>8/4/24</a:t>
             </a:fld>
             <a:endParaRPr lang="en-US"/>
           </a:p>
@@ -1927,7 +1930,7 @@
           <a:p>
             <a:fld id="{0B1FBA5E-B539-C04F-A446-75F49E57522B}" type="datetimeFigureOut">
               <a:rPr lang="en-US" smtClean="0"/>
-              <a:t>2/9/24</a:t>
+              <a:t>8/4/24</a:t>
             </a:fld>
             <a:endParaRPr lang="en-US"/>
           </a:p>
@@ -2127,7 +2130,7 @@
           <a:p>
             <a:fld id="{0B1FBA5E-B539-C04F-A446-75F49E57522B}" type="datetimeFigureOut">
               <a:rPr lang="en-US" smtClean="0"/>
-              <a:t>2/9/24</a:t>
+              <a:t>8/4/24</a:t>
             </a:fld>
             <a:endParaRPr lang="en-US"/>
           </a:p>
@@ -2403,7 +2406,7 @@
           <a:p>
             <a:fld id="{0B1FBA5E-B539-C04F-A446-75F49E57522B}" type="datetimeFigureOut">
               <a:rPr lang="en-US" smtClean="0"/>
-              <a:t>2/9/24</a:t>
+              <a:t>8/4/24</a:t>
             </a:fld>
             <a:endParaRPr lang="en-US"/>
           </a:p>
@@ -2671,7 +2674,7 @@
           <a:p>
             <a:fld id="{0B1FBA5E-B539-C04F-A446-75F49E57522B}" type="datetimeFigureOut">
               <a:rPr lang="en-US" smtClean="0"/>
-              <a:t>2/9/24</a:t>
+              <a:t>8/4/24</a:t>
             </a:fld>
             <a:endParaRPr lang="en-US"/>
           </a:p>
@@ -3086,7 +3089,7 @@
           <a:p>
             <a:fld id="{0B1FBA5E-B539-C04F-A446-75F49E57522B}" type="datetimeFigureOut">
               <a:rPr lang="en-US" smtClean="0"/>
-              <a:t>2/9/24</a:t>
+              <a:t>8/4/24</a:t>
             </a:fld>
             <a:endParaRPr lang="en-US"/>
           </a:p>
@@ -3228,7 +3231,7 @@
           <a:p>
             <a:fld id="{0B1FBA5E-B539-C04F-A446-75F49E57522B}" type="datetimeFigureOut">
               <a:rPr lang="en-US" smtClean="0"/>
-              <a:t>2/9/24</a:t>
+              <a:t>8/4/24</a:t>
             </a:fld>
             <a:endParaRPr lang="en-US"/>
           </a:p>
@@ -3341,7 +3344,7 @@
           <a:p>
             <a:fld id="{0B1FBA5E-B539-C04F-A446-75F49E57522B}" type="datetimeFigureOut">
               <a:rPr lang="en-US" smtClean="0"/>
-              <a:t>2/9/24</a:t>
+              <a:t>8/4/24</a:t>
             </a:fld>
             <a:endParaRPr lang="en-US"/>
           </a:p>
@@ -3654,7 +3657,7 @@
           <a:p>
             <a:fld id="{0B1FBA5E-B539-C04F-A446-75F49E57522B}" type="datetimeFigureOut">
               <a:rPr lang="en-US" smtClean="0"/>
-              <a:t>2/9/24</a:t>
+              <a:t>8/4/24</a:t>
             </a:fld>
             <a:endParaRPr lang="en-US"/>
           </a:p>
@@ -3943,7 +3946,7 @@
           <a:p>
             <a:fld id="{0B1FBA5E-B539-C04F-A446-75F49E57522B}" type="datetimeFigureOut">
               <a:rPr lang="en-US" smtClean="0"/>
-              <a:t>2/9/24</a:t>
+              <a:t>8/4/24</a:t>
             </a:fld>
             <a:endParaRPr lang="en-US"/>
           </a:p>
@@ -4186,7 +4189,7 @@
           <a:p>
             <a:fld id="{0B1FBA5E-B539-C04F-A446-75F49E57522B}" type="datetimeFigureOut">
               <a:rPr lang="en-US" smtClean="0"/>
-              <a:t>2/9/24</a:t>
+              <a:t>8/4/24</a:t>
             </a:fld>
             <a:endParaRPr lang="en-US"/>
           </a:p>
@@ -4605,10 +4608,10 @@
       </p:grpSpPr>
       <p:pic>
         <p:nvPicPr>
-          <p:cNvPr id="3" name="Picture 2">
-            <a:extLst>
-              <a:ext uri="{FF2B5EF4-FFF2-40B4-BE49-F238E27FC236}">
-                <a16:creationId xmlns:a16="http://schemas.microsoft.com/office/drawing/2014/main" id="{489BA681-BF4C-5791-2FC1-36D25DD6A810}"/>
+          <p:cNvPr id="4" name="Picture 3">
+            <a:extLst>
+              <a:ext uri="{FF2B5EF4-FFF2-40B4-BE49-F238E27FC236}">
+                <a16:creationId xmlns:a16="http://schemas.microsoft.com/office/drawing/2014/main" id="{21945190-D01A-DEA1-F309-2EE43C3D4DC5}"/>
               </a:ext>
             </a:extLst>
           </p:cNvPr>
@@ -4625,8 +4628,8 @@
         </p:blipFill>
         <p:spPr>
           <a:xfrm>
-            <a:off x="2209800" y="1410335"/>
-            <a:ext cx="7772400" cy="4037330"/>
+            <a:off x="1580358" y="576526"/>
+            <a:ext cx="5378213" cy="5378213"/>
           </a:xfrm>
           <a:prstGeom prst="rect">
             <a:avLst/>
@@ -4635,10 +4638,10 @@
       </p:pic>
       <p:pic>
         <p:nvPicPr>
-          <p:cNvPr id="6" name="Picture 5">
-            <a:extLst>
-              <a:ext uri="{FF2B5EF4-FFF2-40B4-BE49-F238E27FC236}">
-                <a16:creationId xmlns:a16="http://schemas.microsoft.com/office/drawing/2014/main" id="{AE9B4001-7793-E206-D88A-2E0A943CAD71}"/>
+          <p:cNvPr id="21" name="Picture 20">
+            <a:extLst>
+              <a:ext uri="{FF2B5EF4-FFF2-40B4-BE49-F238E27FC236}">
+                <a16:creationId xmlns:a16="http://schemas.microsoft.com/office/drawing/2014/main" id="{2625E9E7-BFC0-47EC-BD53-8BB2CFA9E389}"/>
               </a:ext>
             </a:extLst>
           </p:cNvPr>
@@ -4649,13 +4652,13 @@
         </p:nvPicPr>
         <p:blipFill rotWithShape="1">
           <a:blip r:embed="rId3"/>
-          <a:srcRect l="71121" t="3026" b="8235"/>
+          <a:srcRect l="70361" t="3613" b="8046"/>
           <a:stretch/>
         </p:blipFill>
         <p:spPr>
           <a:xfrm>
-            <a:off x="9982200" y="2439250"/>
-            <a:ext cx="644212" cy="1979500"/>
+            <a:off x="6958571" y="1842364"/>
+            <a:ext cx="948559" cy="2827283"/>
           </a:xfrm>
           <a:prstGeom prst="rect">
             <a:avLst/>
@@ -4675,7 +4678,508 @@
 </p:sld>
 </file>
 
+<file path=ppt/slides/slide10.xml><?xml version="1.0" encoding="utf-8"?>
+<p:sld xmlns:a="http://schemas.openxmlformats.org/drawingml/2006/main" xmlns:r="http://schemas.openxmlformats.org/officeDocument/2006/relationships" xmlns:p="http://schemas.openxmlformats.org/presentationml/2006/main">
+  <p:cSld>
+    <p:spTree>
+      <p:nvGrpSpPr>
+        <p:cNvPr id="1" name=""/>
+        <p:cNvGrpSpPr/>
+        <p:nvPr/>
+      </p:nvGrpSpPr>
+      <p:grpSpPr>
+        <a:xfrm>
+          <a:off x="0" y="0"/>
+          <a:ext cx="0" cy="0"/>
+          <a:chOff x="0" y="0"/>
+          <a:chExt cx="0" cy="0"/>
+        </a:xfrm>
+      </p:grpSpPr>
+      <p:pic>
+        <p:nvPicPr>
+          <p:cNvPr id="5" name="Picture 4">
+            <a:extLst>
+              <a:ext uri="{FF2B5EF4-FFF2-40B4-BE49-F238E27FC236}">
+                <a16:creationId xmlns:a16="http://schemas.microsoft.com/office/drawing/2014/main" id="{C50C0F6A-5699-1711-0CCF-03D24D706DD1}"/>
+              </a:ext>
+            </a:extLst>
+          </p:cNvPr>
+          <p:cNvPicPr>
+            <a:picLocks noChangeAspect="1"/>
+          </p:cNvPicPr>
+          <p:nvPr/>
+        </p:nvPicPr>
+        <p:blipFill>
+          <a:blip r:embed="rId2"/>
+          <a:stretch>
+            <a:fillRect/>
+          </a:stretch>
+        </p:blipFill>
+        <p:spPr>
+          <a:xfrm>
+            <a:off x="2286000" y="0"/>
+            <a:ext cx="7620000" cy="6858000"/>
+          </a:xfrm>
+          <a:prstGeom prst="rect">
+            <a:avLst/>
+          </a:prstGeom>
+        </p:spPr>
+      </p:pic>
+      <p:pic>
+        <p:nvPicPr>
+          <p:cNvPr id="4" name="Picture 3">
+            <a:extLst>
+              <a:ext uri="{FF2B5EF4-FFF2-40B4-BE49-F238E27FC236}">
+                <a16:creationId xmlns:a16="http://schemas.microsoft.com/office/drawing/2014/main" id="{732BDCF5-D65E-C313-E9A4-6385EA377AA3}"/>
+              </a:ext>
+            </a:extLst>
+          </p:cNvPr>
+          <p:cNvPicPr>
+            <a:picLocks noChangeAspect="1"/>
+          </p:cNvPicPr>
+          <p:nvPr/>
+        </p:nvPicPr>
+        <p:blipFill rotWithShape="1">
+          <a:blip r:embed="rId3"/>
+          <a:srcRect t="30527" r="50000" b="66140"/>
+          <a:stretch/>
+        </p:blipFill>
+        <p:spPr>
+          <a:xfrm>
+            <a:off x="3194656" y="2093495"/>
+            <a:ext cx="3810000" cy="228600"/>
+          </a:xfrm>
+          <a:prstGeom prst="rect">
+            <a:avLst/>
+          </a:prstGeom>
+        </p:spPr>
+      </p:pic>
+      <p:pic>
+        <p:nvPicPr>
+          <p:cNvPr id="7" name="Picture 6">
+            <a:extLst>
+              <a:ext uri="{FF2B5EF4-FFF2-40B4-BE49-F238E27FC236}">
+                <a16:creationId xmlns:a16="http://schemas.microsoft.com/office/drawing/2014/main" id="{E5166475-74B8-98EA-BF8B-21D020729E59}"/>
+              </a:ext>
+            </a:extLst>
+          </p:cNvPr>
+          <p:cNvPicPr>
+            <a:picLocks noChangeAspect="1"/>
+          </p:cNvPicPr>
+          <p:nvPr/>
+        </p:nvPicPr>
+        <p:blipFill rotWithShape="1">
+          <a:blip r:embed="rId3"/>
+          <a:srcRect t="62434" r="46935" b="34233"/>
+          <a:stretch/>
+        </p:blipFill>
+        <p:spPr>
+          <a:xfrm>
+            <a:off x="3213744" y="4281714"/>
+            <a:ext cx="4043548" cy="228600"/>
+          </a:xfrm>
+          <a:prstGeom prst="rect">
+            <a:avLst/>
+          </a:prstGeom>
+        </p:spPr>
+      </p:pic>
+      <p:pic>
+        <p:nvPicPr>
+          <p:cNvPr id="8" name="Picture 7">
+            <a:extLst>
+              <a:ext uri="{FF2B5EF4-FFF2-40B4-BE49-F238E27FC236}">
+                <a16:creationId xmlns:a16="http://schemas.microsoft.com/office/drawing/2014/main" id="{4ABEAE4F-DFB7-200D-F12C-B348249DDE60}"/>
+              </a:ext>
+            </a:extLst>
+          </p:cNvPr>
+          <p:cNvPicPr>
+            <a:picLocks noChangeAspect="1"/>
+          </p:cNvPicPr>
+          <p:nvPr/>
+        </p:nvPicPr>
+        <p:blipFill rotWithShape="1">
+          <a:blip r:embed="rId3"/>
+          <a:srcRect t="94342" r="18561"/>
+          <a:stretch/>
+        </p:blipFill>
+        <p:spPr>
+          <a:xfrm>
+            <a:off x="3184442" y="6469932"/>
+            <a:ext cx="6205634" cy="388067"/>
+          </a:xfrm>
+          <a:prstGeom prst="rect">
+            <a:avLst/>
+          </a:prstGeom>
+        </p:spPr>
+      </p:pic>
+    </p:spTree>
+    <p:extLst>
+      <p:ext uri="{BB962C8B-B14F-4D97-AF65-F5344CB8AC3E}">
+        <p14:creationId xmlns:p14="http://schemas.microsoft.com/office/powerpoint/2010/main" val="1260815481"/>
+      </p:ext>
+    </p:extLst>
+  </p:cSld>
+  <p:clrMapOvr>
+    <a:masterClrMapping/>
+  </p:clrMapOvr>
+</p:sld>
+</file>
+
+<file path=ppt/slides/slide11.xml><?xml version="1.0" encoding="utf-8"?>
+<p:sld xmlns:a="http://schemas.openxmlformats.org/drawingml/2006/main" xmlns:r="http://schemas.openxmlformats.org/officeDocument/2006/relationships" xmlns:p="http://schemas.openxmlformats.org/presentationml/2006/main">
+  <p:cSld>
+    <p:spTree>
+      <p:nvGrpSpPr>
+        <p:cNvPr id="1" name=""/>
+        <p:cNvGrpSpPr/>
+        <p:nvPr/>
+      </p:nvGrpSpPr>
+      <p:grpSpPr>
+        <a:xfrm>
+          <a:off x="0" y="0"/>
+          <a:ext cx="0" cy="0"/>
+          <a:chOff x="0" y="0"/>
+          <a:chExt cx="0" cy="0"/>
+        </a:xfrm>
+      </p:grpSpPr>
+      <p:pic>
+        <p:nvPicPr>
+          <p:cNvPr id="10" name="Picture 9">
+            <a:extLst>
+              <a:ext uri="{FF2B5EF4-FFF2-40B4-BE49-F238E27FC236}">
+                <a16:creationId xmlns:a16="http://schemas.microsoft.com/office/drawing/2014/main" id="{970B6A4E-5EE3-7F0E-3B16-DE54E8B0CBFA}"/>
+              </a:ext>
+            </a:extLst>
+          </p:cNvPr>
+          <p:cNvPicPr>
+            <a:picLocks noChangeAspect="1"/>
+          </p:cNvPicPr>
+          <p:nvPr/>
+        </p:nvPicPr>
+        <p:blipFill>
+          <a:blip r:embed="rId2"/>
+          <a:stretch>
+            <a:fillRect/>
+          </a:stretch>
+        </p:blipFill>
+        <p:spPr>
+          <a:xfrm>
+            <a:off x="3810000" y="1143000"/>
+            <a:ext cx="4572000" cy="4572000"/>
+          </a:xfrm>
+          <a:prstGeom prst="rect">
+            <a:avLst/>
+          </a:prstGeom>
+        </p:spPr>
+      </p:pic>
+      <p:pic>
+        <p:nvPicPr>
+          <p:cNvPr id="2" name="Picture 1">
+            <a:extLst>
+              <a:ext uri="{FF2B5EF4-FFF2-40B4-BE49-F238E27FC236}">
+                <a16:creationId xmlns:a16="http://schemas.microsoft.com/office/drawing/2014/main" id="{C4DEB156-8235-07A1-2ECD-2EC319FC9E94}"/>
+              </a:ext>
+            </a:extLst>
+          </p:cNvPr>
+          <p:cNvPicPr>
+            <a:picLocks noChangeAspect="1"/>
+          </p:cNvPicPr>
+          <p:nvPr/>
+        </p:nvPicPr>
+        <p:blipFill rotWithShape="1">
+          <a:blip r:embed="rId3"/>
+          <a:srcRect l="71121" t="3026" b="8235"/>
+          <a:stretch/>
+        </p:blipFill>
+        <p:spPr>
+          <a:xfrm>
+            <a:off x="8382000" y="2286000"/>
+            <a:ext cx="743960" cy="2286000"/>
+          </a:xfrm>
+          <a:prstGeom prst="rect">
+            <a:avLst/>
+          </a:prstGeom>
+        </p:spPr>
+      </p:pic>
+    </p:spTree>
+    <p:extLst>
+      <p:ext uri="{BB962C8B-B14F-4D97-AF65-F5344CB8AC3E}">
+        <p14:creationId xmlns:p14="http://schemas.microsoft.com/office/powerpoint/2010/main" val="2644506099"/>
+      </p:ext>
+    </p:extLst>
+  </p:cSld>
+  <p:clrMapOvr>
+    <a:masterClrMapping/>
+  </p:clrMapOvr>
+</p:sld>
+</file>
+
 <file path=ppt/slides/slide2.xml><?xml version="1.0" encoding="utf-8"?>
+<p:sld xmlns:a="http://schemas.openxmlformats.org/drawingml/2006/main" xmlns:r="http://schemas.openxmlformats.org/officeDocument/2006/relationships" xmlns:p="http://schemas.openxmlformats.org/presentationml/2006/main">
+  <p:cSld>
+    <p:spTree>
+      <p:nvGrpSpPr>
+        <p:cNvPr id="1" name=""/>
+        <p:cNvGrpSpPr/>
+        <p:nvPr/>
+      </p:nvGrpSpPr>
+      <p:grpSpPr>
+        <a:xfrm>
+          <a:off x="0" y="0"/>
+          <a:ext cx="0" cy="0"/>
+          <a:chOff x="0" y="0"/>
+          <a:chExt cx="0" cy="0"/>
+        </a:xfrm>
+      </p:grpSpPr>
+      <p:pic>
+        <p:nvPicPr>
+          <p:cNvPr id="3" name="Picture 2">
+            <a:extLst>
+              <a:ext uri="{FF2B5EF4-FFF2-40B4-BE49-F238E27FC236}">
+                <a16:creationId xmlns:a16="http://schemas.microsoft.com/office/drawing/2014/main" id="{414CFE49-7A21-09D2-068B-47757FCEFAFC}"/>
+              </a:ext>
+            </a:extLst>
+          </p:cNvPr>
+          <p:cNvPicPr>
+            <a:picLocks noChangeAspect="1"/>
+          </p:cNvPicPr>
+          <p:nvPr/>
+        </p:nvPicPr>
+        <p:blipFill>
+          <a:blip r:embed="rId2"/>
+          <a:stretch>
+            <a:fillRect/>
+          </a:stretch>
+        </p:blipFill>
+        <p:spPr>
+          <a:xfrm>
+            <a:off x="1580357" y="566898"/>
+            <a:ext cx="5378213" cy="5378213"/>
+          </a:xfrm>
+          <a:prstGeom prst="rect">
+            <a:avLst/>
+          </a:prstGeom>
+        </p:spPr>
+      </p:pic>
+      <p:pic>
+        <p:nvPicPr>
+          <p:cNvPr id="21" name="Picture 20">
+            <a:extLst>
+              <a:ext uri="{FF2B5EF4-FFF2-40B4-BE49-F238E27FC236}">
+                <a16:creationId xmlns:a16="http://schemas.microsoft.com/office/drawing/2014/main" id="{2625E9E7-BFC0-47EC-BD53-8BB2CFA9E389}"/>
+              </a:ext>
+            </a:extLst>
+          </p:cNvPr>
+          <p:cNvPicPr>
+            <a:picLocks noChangeAspect="1"/>
+          </p:cNvPicPr>
+          <p:nvPr/>
+        </p:nvPicPr>
+        <p:blipFill rotWithShape="1">
+          <a:blip r:embed="rId3"/>
+          <a:srcRect l="70361" t="3613" b="8046"/>
+          <a:stretch/>
+        </p:blipFill>
+        <p:spPr>
+          <a:xfrm>
+            <a:off x="6958571" y="1842364"/>
+            <a:ext cx="948559" cy="2827283"/>
+          </a:xfrm>
+          <a:prstGeom prst="rect">
+            <a:avLst/>
+          </a:prstGeom>
+        </p:spPr>
+      </p:pic>
+    </p:spTree>
+    <p:extLst>
+      <p:ext uri="{BB962C8B-B14F-4D97-AF65-F5344CB8AC3E}">
+        <p14:creationId xmlns:p14="http://schemas.microsoft.com/office/powerpoint/2010/main" val="3936132679"/>
+      </p:ext>
+    </p:extLst>
+  </p:cSld>
+  <p:clrMapOvr>
+    <a:masterClrMapping/>
+  </p:clrMapOvr>
+</p:sld>
+</file>
+
+<file path=ppt/slides/slide3.xml><?xml version="1.0" encoding="utf-8"?>
+<p:sld xmlns:a="http://schemas.openxmlformats.org/drawingml/2006/main" xmlns:r="http://schemas.openxmlformats.org/officeDocument/2006/relationships" xmlns:p="http://schemas.openxmlformats.org/presentationml/2006/main">
+  <p:cSld>
+    <p:spTree>
+      <p:nvGrpSpPr>
+        <p:cNvPr id="1" name=""/>
+        <p:cNvGrpSpPr/>
+        <p:nvPr/>
+      </p:nvGrpSpPr>
+      <p:grpSpPr>
+        <a:xfrm>
+          <a:off x="0" y="0"/>
+          <a:ext cx="0" cy="0"/>
+          <a:chOff x="0" y="0"/>
+          <a:chExt cx="0" cy="0"/>
+        </a:xfrm>
+      </p:grpSpPr>
+      <p:pic>
+        <p:nvPicPr>
+          <p:cNvPr id="21" name="Picture 20">
+            <a:extLst>
+              <a:ext uri="{FF2B5EF4-FFF2-40B4-BE49-F238E27FC236}">
+                <a16:creationId xmlns:a16="http://schemas.microsoft.com/office/drawing/2014/main" id="{2625E9E7-BFC0-47EC-BD53-8BB2CFA9E389}"/>
+              </a:ext>
+            </a:extLst>
+          </p:cNvPr>
+          <p:cNvPicPr>
+            <a:picLocks noChangeAspect="1"/>
+          </p:cNvPicPr>
+          <p:nvPr/>
+        </p:nvPicPr>
+        <p:blipFill rotWithShape="1">
+          <a:blip r:embed="rId2"/>
+          <a:srcRect l="70361" t="3613" b="8046"/>
+          <a:stretch/>
+        </p:blipFill>
+        <p:spPr>
+          <a:xfrm>
+            <a:off x="7634614" y="2238674"/>
+            <a:ext cx="747385" cy="2227662"/>
+          </a:xfrm>
+          <a:prstGeom prst="rect">
+            <a:avLst/>
+          </a:prstGeom>
+        </p:spPr>
+      </p:pic>
+      <p:pic>
+        <p:nvPicPr>
+          <p:cNvPr id="3" name="Picture 2">
+            <a:extLst>
+              <a:ext uri="{FF2B5EF4-FFF2-40B4-BE49-F238E27FC236}">
+                <a16:creationId xmlns:a16="http://schemas.microsoft.com/office/drawing/2014/main" id="{967AA734-0081-DFB8-333A-972B693A0103}"/>
+              </a:ext>
+            </a:extLst>
+          </p:cNvPr>
+          <p:cNvPicPr>
+            <a:picLocks noChangeAspect="1"/>
+          </p:cNvPicPr>
+          <p:nvPr/>
+        </p:nvPicPr>
+        <p:blipFill rotWithShape="1">
+          <a:blip r:embed="rId3"/>
+          <a:srcRect b="6963"/>
+          <a:stretch/>
+        </p:blipFill>
+        <p:spPr>
+          <a:xfrm>
+            <a:off x="776614" y="1979916"/>
+            <a:ext cx="6858000" cy="2552178"/>
+          </a:xfrm>
+          <a:prstGeom prst="rect">
+            <a:avLst/>
+          </a:prstGeom>
+        </p:spPr>
+      </p:pic>
+    </p:spTree>
+    <p:extLst>
+      <p:ext uri="{BB962C8B-B14F-4D97-AF65-F5344CB8AC3E}">
+        <p14:creationId xmlns:p14="http://schemas.microsoft.com/office/powerpoint/2010/main" val="2623451237"/>
+      </p:ext>
+    </p:extLst>
+  </p:cSld>
+  <p:clrMapOvr>
+    <a:masterClrMapping/>
+  </p:clrMapOvr>
+</p:sld>
+</file>
+
+<file path=ppt/slides/slide4.xml><?xml version="1.0" encoding="utf-8"?>
+<p:sld xmlns:a="http://schemas.openxmlformats.org/drawingml/2006/main" xmlns:r="http://schemas.openxmlformats.org/officeDocument/2006/relationships" xmlns:p="http://schemas.openxmlformats.org/presentationml/2006/main">
+  <p:cSld>
+    <p:spTree>
+      <p:nvGrpSpPr>
+        <p:cNvPr id="1" name=""/>
+        <p:cNvGrpSpPr/>
+        <p:nvPr/>
+      </p:nvGrpSpPr>
+      <p:grpSpPr>
+        <a:xfrm>
+          <a:off x="0" y="0"/>
+          <a:ext cx="0" cy="0"/>
+          <a:chOff x="0" y="0"/>
+          <a:chExt cx="0" cy="0"/>
+        </a:xfrm>
+      </p:grpSpPr>
+      <p:pic>
+        <p:nvPicPr>
+          <p:cNvPr id="4" name="Picture 3">
+            <a:extLst>
+              <a:ext uri="{FF2B5EF4-FFF2-40B4-BE49-F238E27FC236}">
+                <a16:creationId xmlns:a16="http://schemas.microsoft.com/office/drawing/2014/main" id="{7F614202-99A9-4E80-9239-12777C3F85BE}"/>
+              </a:ext>
+            </a:extLst>
+          </p:cNvPr>
+          <p:cNvPicPr>
+            <a:picLocks noChangeAspect="1"/>
+          </p:cNvPicPr>
+          <p:nvPr/>
+        </p:nvPicPr>
+        <p:blipFill rotWithShape="1">
+          <a:blip r:embed="rId2"/>
+          <a:srcRect b="9361"/>
+          <a:stretch/>
+        </p:blipFill>
+        <p:spPr>
+          <a:xfrm>
+            <a:off x="3062614" y="1979916"/>
+            <a:ext cx="4572000" cy="2486420"/>
+          </a:xfrm>
+          <a:prstGeom prst="rect">
+            <a:avLst/>
+          </a:prstGeom>
+        </p:spPr>
+      </p:pic>
+      <p:pic>
+        <p:nvPicPr>
+          <p:cNvPr id="6" name="Picture 5">
+            <a:extLst>
+              <a:ext uri="{FF2B5EF4-FFF2-40B4-BE49-F238E27FC236}">
+                <a16:creationId xmlns:a16="http://schemas.microsoft.com/office/drawing/2014/main" id="{9DA7FC4F-2A37-D565-3A69-FA3621E0476E}"/>
+              </a:ext>
+            </a:extLst>
+          </p:cNvPr>
+          <p:cNvPicPr>
+            <a:picLocks noChangeAspect="1"/>
+          </p:cNvPicPr>
+          <p:nvPr/>
+        </p:nvPicPr>
+        <p:blipFill rotWithShape="1">
+          <a:blip r:embed="rId3"/>
+          <a:srcRect l="70168" b="8007"/>
+          <a:stretch/>
+        </p:blipFill>
+        <p:spPr>
+          <a:xfrm>
+            <a:off x="7612130" y="2146227"/>
+            <a:ext cx="745932" cy="2300257"/>
+          </a:xfrm>
+          <a:prstGeom prst="rect">
+            <a:avLst/>
+          </a:prstGeom>
+        </p:spPr>
+      </p:pic>
+    </p:spTree>
+    <p:extLst>
+      <p:ext uri="{BB962C8B-B14F-4D97-AF65-F5344CB8AC3E}">
+        <p14:creationId xmlns:p14="http://schemas.microsoft.com/office/powerpoint/2010/main" val="2141629555"/>
+      </p:ext>
+    </p:extLst>
+  </p:cSld>
+  <p:clrMapOvr>
+    <a:masterClrMapping/>
+  </p:clrMapOvr>
+</p:sld>
+</file>
+
+<file path=ppt/slides/slide5.xml><?xml version="1.0" encoding="utf-8"?>
 <p:sld xmlns:a="http://schemas.openxmlformats.org/drawingml/2006/main" xmlns:r="http://schemas.openxmlformats.org/officeDocument/2006/relationships" xmlns:p="http://schemas.openxmlformats.org/presentationml/2006/main">
   <p:cSld>
     <p:spTree>
@@ -4764,7 +5268,7 @@
 </p:sld>
 </file>
 
-<file path=ppt/slides/slide3.xml><?xml version="1.0" encoding="utf-8"?>
+<file path=ppt/slides/slide6.xml><?xml version="1.0" encoding="utf-8"?>
 <p:sld xmlns:a="http://schemas.openxmlformats.org/drawingml/2006/main" xmlns:r="http://schemas.openxmlformats.org/officeDocument/2006/relationships" xmlns:p="http://schemas.openxmlformats.org/presentationml/2006/main">
   <p:cSld>
     <p:spTree>
@@ -4883,7 +5387,7 @@
 </p:sld>
 </file>
 
-<file path=ppt/slides/slide4.xml><?xml version="1.0" encoding="utf-8"?>
+<file path=ppt/slides/slide7.xml><?xml version="1.0" encoding="utf-8"?>
 <p:sld xmlns:a="http://schemas.openxmlformats.org/drawingml/2006/main" xmlns:r="http://schemas.openxmlformats.org/officeDocument/2006/relationships" xmlns:p="http://schemas.openxmlformats.org/presentationml/2006/main">
   <p:cSld>
     <p:spTree>
@@ -5030,7 +5534,7 @@
 </p:sld>
 </file>
 
-<file path=ppt/slides/slide5.xml><?xml version="1.0" encoding="utf-8"?>
+<file path=ppt/slides/slide8.xml><?xml version="1.0" encoding="utf-8"?>
 <p:sld xmlns:a="http://schemas.openxmlformats.org/drawingml/2006/main" xmlns:r="http://schemas.openxmlformats.org/officeDocument/2006/relationships" xmlns:p="http://schemas.openxmlformats.org/presentationml/2006/main">
   <p:cSld>
     <p:spTree>
@@ -5119,7 +5623,7 @@
 </p:sld>
 </file>
 
-<file path=ppt/slides/slide6.xml><?xml version="1.0" encoding="utf-8"?>
+<file path=ppt/slides/slide9.xml><?xml version="1.0" encoding="utf-8"?>
 <p:sld xmlns:a="http://schemas.openxmlformats.org/drawingml/2006/main" xmlns:r="http://schemas.openxmlformats.org/officeDocument/2006/relationships" xmlns:p="http://schemas.openxmlformats.org/presentationml/2006/main">
   <p:cSld>
     <p:spTree>
@@ -5281,242 +5785,6 @@
     <p:extLst>
       <p:ext uri="{BB962C8B-B14F-4D97-AF65-F5344CB8AC3E}">
         <p14:creationId xmlns:p14="http://schemas.microsoft.com/office/powerpoint/2010/main" val="4029959847"/>
-      </p:ext>
-    </p:extLst>
-  </p:cSld>
-  <p:clrMapOvr>
-    <a:masterClrMapping/>
-  </p:clrMapOvr>
-</p:sld>
-</file>
-
-<file path=ppt/slides/slide7.xml><?xml version="1.0" encoding="utf-8"?>
-<p:sld xmlns:a="http://schemas.openxmlformats.org/drawingml/2006/main" xmlns:r="http://schemas.openxmlformats.org/officeDocument/2006/relationships" xmlns:p="http://schemas.openxmlformats.org/presentationml/2006/main">
-  <p:cSld>
-    <p:spTree>
-      <p:nvGrpSpPr>
-        <p:cNvPr id="1" name=""/>
-        <p:cNvGrpSpPr/>
-        <p:nvPr/>
-      </p:nvGrpSpPr>
-      <p:grpSpPr>
-        <a:xfrm>
-          <a:off x="0" y="0"/>
-          <a:ext cx="0" cy="0"/>
-          <a:chOff x="0" y="0"/>
-          <a:chExt cx="0" cy="0"/>
-        </a:xfrm>
-      </p:grpSpPr>
-      <p:pic>
-        <p:nvPicPr>
-          <p:cNvPr id="5" name="Picture 4">
-            <a:extLst>
-              <a:ext uri="{FF2B5EF4-FFF2-40B4-BE49-F238E27FC236}">
-                <a16:creationId xmlns:a16="http://schemas.microsoft.com/office/drawing/2014/main" id="{C50C0F6A-5699-1711-0CCF-03D24D706DD1}"/>
-              </a:ext>
-            </a:extLst>
-          </p:cNvPr>
-          <p:cNvPicPr>
-            <a:picLocks noChangeAspect="1"/>
-          </p:cNvPicPr>
-          <p:nvPr/>
-        </p:nvPicPr>
-        <p:blipFill>
-          <a:blip r:embed="rId2"/>
-          <a:stretch>
-            <a:fillRect/>
-          </a:stretch>
-        </p:blipFill>
-        <p:spPr>
-          <a:xfrm>
-            <a:off x="2286000" y="0"/>
-            <a:ext cx="7620000" cy="6858000"/>
-          </a:xfrm>
-          <a:prstGeom prst="rect">
-            <a:avLst/>
-          </a:prstGeom>
-        </p:spPr>
-      </p:pic>
-      <p:pic>
-        <p:nvPicPr>
-          <p:cNvPr id="4" name="Picture 3">
-            <a:extLst>
-              <a:ext uri="{FF2B5EF4-FFF2-40B4-BE49-F238E27FC236}">
-                <a16:creationId xmlns:a16="http://schemas.microsoft.com/office/drawing/2014/main" id="{732BDCF5-D65E-C313-E9A4-6385EA377AA3}"/>
-              </a:ext>
-            </a:extLst>
-          </p:cNvPr>
-          <p:cNvPicPr>
-            <a:picLocks noChangeAspect="1"/>
-          </p:cNvPicPr>
-          <p:nvPr/>
-        </p:nvPicPr>
-        <p:blipFill rotWithShape="1">
-          <a:blip r:embed="rId3"/>
-          <a:srcRect t="30527" r="50000" b="66140"/>
-          <a:stretch/>
-        </p:blipFill>
-        <p:spPr>
-          <a:xfrm>
-            <a:off x="3194656" y="2093495"/>
-            <a:ext cx="3810000" cy="228600"/>
-          </a:xfrm>
-          <a:prstGeom prst="rect">
-            <a:avLst/>
-          </a:prstGeom>
-        </p:spPr>
-      </p:pic>
-      <p:pic>
-        <p:nvPicPr>
-          <p:cNvPr id="7" name="Picture 6">
-            <a:extLst>
-              <a:ext uri="{FF2B5EF4-FFF2-40B4-BE49-F238E27FC236}">
-                <a16:creationId xmlns:a16="http://schemas.microsoft.com/office/drawing/2014/main" id="{E5166475-74B8-98EA-BF8B-21D020729E59}"/>
-              </a:ext>
-            </a:extLst>
-          </p:cNvPr>
-          <p:cNvPicPr>
-            <a:picLocks noChangeAspect="1"/>
-          </p:cNvPicPr>
-          <p:nvPr/>
-        </p:nvPicPr>
-        <p:blipFill rotWithShape="1">
-          <a:blip r:embed="rId3"/>
-          <a:srcRect t="62434" r="46935" b="34233"/>
-          <a:stretch/>
-        </p:blipFill>
-        <p:spPr>
-          <a:xfrm>
-            <a:off x="3213744" y="4281714"/>
-            <a:ext cx="4043548" cy="228600"/>
-          </a:xfrm>
-          <a:prstGeom prst="rect">
-            <a:avLst/>
-          </a:prstGeom>
-        </p:spPr>
-      </p:pic>
-      <p:pic>
-        <p:nvPicPr>
-          <p:cNvPr id="8" name="Picture 7">
-            <a:extLst>
-              <a:ext uri="{FF2B5EF4-FFF2-40B4-BE49-F238E27FC236}">
-                <a16:creationId xmlns:a16="http://schemas.microsoft.com/office/drawing/2014/main" id="{4ABEAE4F-DFB7-200D-F12C-B348249DDE60}"/>
-              </a:ext>
-            </a:extLst>
-          </p:cNvPr>
-          <p:cNvPicPr>
-            <a:picLocks noChangeAspect="1"/>
-          </p:cNvPicPr>
-          <p:nvPr/>
-        </p:nvPicPr>
-        <p:blipFill rotWithShape="1">
-          <a:blip r:embed="rId3"/>
-          <a:srcRect t="94342" r="18561"/>
-          <a:stretch/>
-        </p:blipFill>
-        <p:spPr>
-          <a:xfrm>
-            <a:off x="3184442" y="6469932"/>
-            <a:ext cx="6205634" cy="388067"/>
-          </a:xfrm>
-          <a:prstGeom prst="rect">
-            <a:avLst/>
-          </a:prstGeom>
-        </p:spPr>
-      </p:pic>
-    </p:spTree>
-    <p:extLst>
-      <p:ext uri="{BB962C8B-B14F-4D97-AF65-F5344CB8AC3E}">
-        <p14:creationId xmlns:p14="http://schemas.microsoft.com/office/powerpoint/2010/main" val="1260815481"/>
-      </p:ext>
-    </p:extLst>
-  </p:cSld>
-  <p:clrMapOvr>
-    <a:masterClrMapping/>
-  </p:clrMapOvr>
-</p:sld>
-</file>
-
-<file path=ppt/slides/slide8.xml><?xml version="1.0" encoding="utf-8"?>
-<p:sld xmlns:a="http://schemas.openxmlformats.org/drawingml/2006/main" xmlns:r="http://schemas.openxmlformats.org/officeDocument/2006/relationships" xmlns:p="http://schemas.openxmlformats.org/presentationml/2006/main">
-  <p:cSld>
-    <p:spTree>
-      <p:nvGrpSpPr>
-        <p:cNvPr id="1" name=""/>
-        <p:cNvGrpSpPr/>
-        <p:nvPr/>
-      </p:nvGrpSpPr>
-      <p:grpSpPr>
-        <a:xfrm>
-          <a:off x="0" y="0"/>
-          <a:ext cx="0" cy="0"/>
-          <a:chOff x="0" y="0"/>
-          <a:chExt cx="0" cy="0"/>
-        </a:xfrm>
-      </p:grpSpPr>
-      <p:pic>
-        <p:nvPicPr>
-          <p:cNvPr id="10" name="Picture 9">
-            <a:extLst>
-              <a:ext uri="{FF2B5EF4-FFF2-40B4-BE49-F238E27FC236}">
-                <a16:creationId xmlns:a16="http://schemas.microsoft.com/office/drawing/2014/main" id="{970B6A4E-5EE3-7F0E-3B16-DE54E8B0CBFA}"/>
-              </a:ext>
-            </a:extLst>
-          </p:cNvPr>
-          <p:cNvPicPr>
-            <a:picLocks noChangeAspect="1"/>
-          </p:cNvPicPr>
-          <p:nvPr/>
-        </p:nvPicPr>
-        <p:blipFill>
-          <a:blip r:embed="rId2"/>
-          <a:stretch>
-            <a:fillRect/>
-          </a:stretch>
-        </p:blipFill>
-        <p:spPr>
-          <a:xfrm>
-            <a:off x="3810000" y="1143000"/>
-            <a:ext cx="4572000" cy="4572000"/>
-          </a:xfrm>
-          <a:prstGeom prst="rect">
-            <a:avLst/>
-          </a:prstGeom>
-        </p:spPr>
-      </p:pic>
-      <p:pic>
-        <p:nvPicPr>
-          <p:cNvPr id="2" name="Picture 1">
-            <a:extLst>
-              <a:ext uri="{FF2B5EF4-FFF2-40B4-BE49-F238E27FC236}">
-                <a16:creationId xmlns:a16="http://schemas.microsoft.com/office/drawing/2014/main" id="{C4DEB156-8235-07A1-2ECD-2EC319FC9E94}"/>
-              </a:ext>
-            </a:extLst>
-          </p:cNvPr>
-          <p:cNvPicPr>
-            <a:picLocks noChangeAspect="1"/>
-          </p:cNvPicPr>
-          <p:nvPr/>
-        </p:nvPicPr>
-        <p:blipFill rotWithShape="1">
-          <a:blip r:embed="rId3"/>
-          <a:srcRect l="71121" t="3026" b="8235"/>
-          <a:stretch/>
-        </p:blipFill>
-        <p:spPr>
-          <a:xfrm>
-            <a:off x="8382000" y="2286000"/>
-            <a:ext cx="743960" cy="2286000"/>
-          </a:xfrm>
-          <a:prstGeom prst="rect">
-            <a:avLst/>
-          </a:prstGeom>
-        </p:spPr>
-      </p:pic>
-    </p:spTree>
-    <p:extLst>
-      <p:ext uri="{BB962C8B-B14F-4D97-AF65-F5344CB8AC3E}">
-        <p14:creationId xmlns:p14="http://schemas.microsoft.com/office/powerpoint/2010/main" val="2644506099"/>
       </p:ext>
     </p:extLst>
   </p:cSld>

</xml_diff>